<commit_message>
basic project info stuff
</commit_message>
<xml_diff>
--- a/WelcomeIntros.pptx
+++ b/WelcomeIntros.pptx
@@ -5,24 +5,26 @@
     <p:sldMasterId id="2147483684" r:id="rId1"/>
   </p:sldMasterIdLst>
   <p:notesMasterIdLst>
-    <p:notesMasterId r:id="rId5"/>
+    <p:notesMasterId r:id="rId7"/>
   </p:notesMasterIdLst>
   <p:sldIdLst>
     <p:sldId id="256" r:id="rId2"/>
     <p:sldId id="257" r:id="rId3"/>
-    <p:sldId id="386" r:id="rId4"/>
+    <p:sldId id="387" r:id="rId4"/>
+    <p:sldId id="388" r:id="rId5"/>
+    <p:sldId id="386" r:id="rId6"/>
   </p:sldIdLst>
   <p:sldSz cx="12192000" cy="6858000"/>
   <p:notesSz cx="6858000" cy="9144000"/>
   <p:embeddedFontLst>
     <p:embeddedFont>
       <p:font typeface="Director" pitchFamily="2" charset="0"/>
-      <p:regular r:id="rId6"/>
+      <p:regular r:id="rId8"/>
     </p:embeddedFont>
     <p:embeddedFont>
       <p:font typeface="Inter" panose="02000503000000020004" pitchFamily="2" charset="0"/>
-      <p:regular r:id="rId7"/>
-      <p:bold r:id="rId8"/>
+      <p:regular r:id="rId9"/>
+      <p:bold r:id="rId10"/>
     </p:embeddedFont>
   </p:embeddedFontLst>
   <p:defaultTextStyle>
@@ -210,7 +212,7 @@
           <a:p>
             <a:fld id="{7CF2004C-AD6B-4A9A-A490-3730F26EBC0C}" type="datetimeFigureOut">
               <a:rPr lang="en-US" smtClean="0"/>
-              <a:t>6/4/2025</a:t>
+              <a:t>6/5/2025</a:t>
             </a:fld>
             <a:endParaRPr lang="en-US"/>
           </a:p>
@@ -608,7 +610,7 @@
           <a:p>
             <a:fld id="{2E6CAD52-DA28-4E78-92DA-C35A0DBEE03A}" type="datetimeFigureOut">
               <a:rPr lang="en-US" smtClean="0"/>
-              <a:t>6/4/2025</a:t>
+              <a:t>6/5/2025</a:t>
             </a:fld>
             <a:endParaRPr lang="en-US"/>
           </a:p>
@@ -778,7 +780,7 @@
           <a:p>
             <a:fld id="{2E6CAD52-DA28-4E78-92DA-C35A0DBEE03A}" type="datetimeFigureOut">
               <a:rPr lang="en-US" smtClean="0"/>
-              <a:t>6/4/2025</a:t>
+              <a:t>6/5/2025</a:t>
             </a:fld>
             <a:endParaRPr lang="en-US"/>
           </a:p>
@@ -958,7 +960,7 @@
           <a:p>
             <a:fld id="{2E6CAD52-DA28-4E78-92DA-C35A0DBEE03A}" type="datetimeFigureOut">
               <a:rPr lang="en-US" smtClean="0"/>
-              <a:t>6/4/2025</a:t>
+              <a:t>6/5/2025</a:t>
             </a:fld>
             <a:endParaRPr lang="en-US"/>
           </a:p>
@@ -1128,7 +1130,7 @@
           <a:p>
             <a:fld id="{2E6CAD52-DA28-4E78-92DA-C35A0DBEE03A}" type="datetimeFigureOut">
               <a:rPr lang="en-US" smtClean="0"/>
-              <a:t>6/4/2025</a:t>
+              <a:t>6/5/2025</a:t>
             </a:fld>
             <a:endParaRPr lang="en-US"/>
           </a:p>
@@ -1374,7 +1376,7 @@
           <a:p>
             <a:fld id="{2E6CAD52-DA28-4E78-92DA-C35A0DBEE03A}" type="datetimeFigureOut">
               <a:rPr lang="en-US" smtClean="0"/>
-              <a:t>6/4/2025</a:t>
+              <a:t>6/5/2025</a:t>
             </a:fld>
             <a:endParaRPr lang="en-US"/>
           </a:p>
@@ -1606,7 +1608,7 @@
           <a:p>
             <a:fld id="{2E6CAD52-DA28-4E78-92DA-C35A0DBEE03A}" type="datetimeFigureOut">
               <a:rPr lang="en-US" smtClean="0"/>
-              <a:t>6/4/2025</a:t>
+              <a:t>6/5/2025</a:t>
             </a:fld>
             <a:endParaRPr lang="en-US"/>
           </a:p>
@@ -1973,7 +1975,7 @@
           <a:p>
             <a:fld id="{2E6CAD52-DA28-4E78-92DA-C35A0DBEE03A}" type="datetimeFigureOut">
               <a:rPr lang="en-US" smtClean="0"/>
-              <a:t>6/4/2025</a:t>
+              <a:t>6/5/2025</a:t>
             </a:fld>
             <a:endParaRPr lang="en-US"/>
           </a:p>
@@ -2091,7 +2093,7 @@
           <a:p>
             <a:fld id="{2E6CAD52-DA28-4E78-92DA-C35A0DBEE03A}" type="datetimeFigureOut">
               <a:rPr lang="en-US" smtClean="0"/>
-              <a:t>6/4/2025</a:t>
+              <a:t>6/5/2025</a:t>
             </a:fld>
             <a:endParaRPr lang="en-US"/>
           </a:p>
@@ -2186,7 +2188,7 @@
           <a:p>
             <a:fld id="{2E6CAD52-DA28-4E78-92DA-C35A0DBEE03A}" type="datetimeFigureOut">
               <a:rPr lang="en-US" smtClean="0"/>
-              <a:t>6/4/2025</a:t>
+              <a:t>6/5/2025</a:t>
             </a:fld>
             <a:endParaRPr lang="en-US"/>
           </a:p>
@@ -2463,7 +2465,7 @@
           <a:p>
             <a:fld id="{2E6CAD52-DA28-4E78-92DA-C35A0DBEE03A}" type="datetimeFigureOut">
               <a:rPr lang="en-US" smtClean="0"/>
-              <a:t>6/4/2025</a:t>
+              <a:t>6/5/2025</a:t>
             </a:fld>
             <a:endParaRPr lang="en-US"/>
           </a:p>
@@ -2720,7 +2722,7 @@
           <a:p>
             <a:fld id="{2E6CAD52-DA28-4E78-92DA-C35A0DBEE03A}" type="datetimeFigureOut">
               <a:rPr lang="en-US" smtClean="0"/>
-              <a:t>6/4/2025</a:t>
+              <a:t>6/5/2025</a:t>
             </a:fld>
             <a:endParaRPr lang="en-US"/>
           </a:p>
@@ -2933,7 +2935,7 @@
           <a:p>
             <a:fld id="{2E6CAD52-DA28-4E78-92DA-C35A0DBEE03A}" type="datetimeFigureOut">
               <a:rPr lang="en-US" smtClean="0"/>
-              <a:t>6/4/2025</a:t>
+              <a:t>6/5/2025</a:t>
             </a:fld>
             <a:endParaRPr lang="en-US"/>
           </a:p>
@@ -3501,6 +3503,16 @@
               <a:buFont typeface="Arial" panose="020B0604020202020204" pitchFamily="34" charset="0"/>
               <a:buChar char="•"/>
             </a:pPr>
+            <a:r>
+              <a:rPr lang="en-US" dirty="0"/>
+              <a:t>Photos</a:t>
+            </a:r>
+          </a:p>
+          <a:p>
+            <a:pPr marL="342900" indent="-342900">
+              <a:buFont typeface="Arial" panose="020B0604020202020204" pitchFamily="34" charset="0"/>
+              <a:buChar char="•"/>
+            </a:pPr>
             <a:endParaRPr lang="en-US" dirty="0"/>
           </a:p>
         </p:txBody>
@@ -3555,6 +3567,179 @@
 </file>
 
 <file path=ppt/slides/slide3.xml><?xml version="1.0" encoding="utf-8"?>
+<p:sld xmlns:a="http://schemas.openxmlformats.org/drawingml/2006/main" xmlns:r="http://schemas.openxmlformats.org/officeDocument/2006/relationships" xmlns:p="http://schemas.openxmlformats.org/presentationml/2006/main">
+  <p:cSld>
+    <p:spTree>
+      <p:nvGrpSpPr>
+        <p:cNvPr id="1" name=""/>
+        <p:cNvGrpSpPr/>
+        <p:nvPr/>
+      </p:nvGrpSpPr>
+      <p:grpSpPr>
+        <a:xfrm>
+          <a:off x="0" y="0"/>
+          <a:ext cx="0" cy="0"/>
+          <a:chOff x="0" y="0"/>
+          <a:chExt cx="0" cy="0"/>
+        </a:xfrm>
+      </p:grpSpPr>
+      <p:sp>
+        <p:nvSpPr>
+          <p:cNvPr id="2" name="Title 1">
+            <a:extLst>
+              <a:ext uri="{FF2B5EF4-FFF2-40B4-BE49-F238E27FC236}">
+                <a16:creationId xmlns:a16="http://schemas.microsoft.com/office/drawing/2014/main" id="{3AAF35A1-C251-0BD2-EF2F-AAAE12FD17A4}"/>
+              </a:ext>
+            </a:extLst>
+          </p:cNvPr>
+          <p:cNvSpPr>
+            <a:spLocks noGrp="1"/>
+          </p:cNvSpPr>
+          <p:nvPr>
+            <p:ph type="ctrTitle"/>
+          </p:nvPr>
+        </p:nvSpPr>
+        <p:spPr/>
+        <p:txBody>
+          <a:bodyPr/>
+          <a:lstStyle/>
+          <a:p>
+            <a:r>
+              <a:rPr lang="en-US" dirty="0"/>
+              <a:t>Introductions</a:t>
+            </a:r>
+          </a:p>
+        </p:txBody>
+      </p:sp>
+      <p:sp>
+        <p:nvSpPr>
+          <p:cNvPr id="3" name="Subtitle 2">
+            <a:extLst>
+              <a:ext uri="{FF2B5EF4-FFF2-40B4-BE49-F238E27FC236}">
+                <a16:creationId xmlns:a16="http://schemas.microsoft.com/office/drawing/2014/main" id="{FACB781B-A161-774E-2DCA-A227BA53D269}"/>
+              </a:ext>
+            </a:extLst>
+          </p:cNvPr>
+          <p:cNvSpPr>
+            <a:spLocks noGrp="1"/>
+          </p:cNvSpPr>
+          <p:nvPr>
+            <p:ph type="subTitle" idx="1"/>
+          </p:nvPr>
+        </p:nvSpPr>
+        <p:spPr/>
+        <p:txBody>
+          <a:bodyPr/>
+          <a:lstStyle/>
+          <a:p>
+            <a:endParaRPr lang="en-US"/>
+          </a:p>
+        </p:txBody>
+      </p:sp>
+    </p:spTree>
+    <p:extLst>
+      <p:ext uri="{BB962C8B-B14F-4D97-AF65-F5344CB8AC3E}">
+        <p14:creationId xmlns:p14="http://schemas.microsoft.com/office/powerpoint/2010/main" val="2135413087"/>
+      </p:ext>
+    </p:extLst>
+  </p:cSld>
+  <p:clrMapOvr>
+    <a:masterClrMapping/>
+  </p:clrMapOvr>
+</p:sld>
+</file>
+
+<file path=ppt/slides/slide4.xml><?xml version="1.0" encoding="utf-8"?>
+<p:sld xmlns:a="http://schemas.openxmlformats.org/drawingml/2006/main" xmlns:r="http://schemas.openxmlformats.org/officeDocument/2006/relationships" xmlns:p="http://schemas.openxmlformats.org/presentationml/2006/main">
+  <p:cSld>
+    <p:spTree>
+      <p:nvGrpSpPr>
+        <p:cNvPr id="1" name="">
+          <a:extLst>
+            <a:ext uri="{FF2B5EF4-FFF2-40B4-BE49-F238E27FC236}">
+              <a16:creationId xmlns:a16="http://schemas.microsoft.com/office/drawing/2014/main" id="{E18C41CC-565E-30F9-BD56-475F6C7D558E}"/>
+            </a:ext>
+          </a:extLst>
+        </p:cNvPr>
+        <p:cNvGrpSpPr/>
+        <p:nvPr/>
+      </p:nvGrpSpPr>
+      <p:grpSpPr>
+        <a:xfrm>
+          <a:off x="0" y="0"/>
+          <a:ext cx="0" cy="0"/>
+          <a:chOff x="0" y="0"/>
+          <a:chExt cx="0" cy="0"/>
+        </a:xfrm>
+      </p:grpSpPr>
+      <p:sp>
+        <p:nvSpPr>
+          <p:cNvPr id="2" name="Title 1">
+            <a:extLst>
+              <a:ext uri="{FF2B5EF4-FFF2-40B4-BE49-F238E27FC236}">
+                <a16:creationId xmlns:a16="http://schemas.microsoft.com/office/drawing/2014/main" id="{648D6FBA-3F49-E4D7-5A41-01156F23BAFA}"/>
+              </a:ext>
+            </a:extLst>
+          </p:cNvPr>
+          <p:cNvSpPr>
+            <a:spLocks noGrp="1"/>
+          </p:cNvSpPr>
+          <p:nvPr>
+            <p:ph type="ctrTitle"/>
+          </p:nvPr>
+        </p:nvSpPr>
+        <p:spPr/>
+        <p:txBody>
+          <a:bodyPr/>
+          <a:lstStyle/>
+          <a:p>
+            <a:r>
+              <a:rPr lang="en-US"/>
+              <a:t>Photos</a:t>
+            </a:r>
+            <a:endParaRPr lang="en-US" dirty="0"/>
+          </a:p>
+        </p:txBody>
+      </p:sp>
+      <p:sp>
+        <p:nvSpPr>
+          <p:cNvPr id="3" name="Subtitle 2">
+            <a:extLst>
+              <a:ext uri="{FF2B5EF4-FFF2-40B4-BE49-F238E27FC236}">
+                <a16:creationId xmlns:a16="http://schemas.microsoft.com/office/drawing/2014/main" id="{97664F70-3C89-C4E9-4257-4AD587C3727A}"/>
+              </a:ext>
+            </a:extLst>
+          </p:cNvPr>
+          <p:cNvSpPr>
+            <a:spLocks noGrp="1"/>
+          </p:cNvSpPr>
+          <p:nvPr>
+            <p:ph type="subTitle" idx="1"/>
+          </p:nvPr>
+        </p:nvSpPr>
+        <p:spPr/>
+        <p:txBody>
+          <a:bodyPr/>
+          <a:lstStyle/>
+          <a:p>
+            <a:endParaRPr lang="en-US"/>
+          </a:p>
+        </p:txBody>
+      </p:sp>
+    </p:spTree>
+    <p:extLst>
+      <p:ext uri="{BB962C8B-B14F-4D97-AF65-F5344CB8AC3E}">
+        <p14:creationId xmlns:p14="http://schemas.microsoft.com/office/powerpoint/2010/main" val="2665885096"/>
+      </p:ext>
+    </p:extLst>
+  </p:cSld>
+  <p:clrMapOvr>
+    <a:masterClrMapping/>
+  </p:clrMapOvr>
+</p:sld>
+</file>
+
+<file path=ppt/slides/slide5.xml><?xml version="1.0" encoding="utf-8"?>
 <p:sld xmlns:a="http://schemas.openxmlformats.org/drawingml/2006/main" xmlns:r="http://schemas.openxmlformats.org/officeDocument/2006/relationships" xmlns:p="http://schemas.openxmlformats.org/presentationml/2006/main">
   <p:cSld>
     <p:spTree>

</xml_diff>

<commit_message>
Update gitbook 2025-06-05 15:01:49
</commit_message>
<xml_diff>
--- a/WelcomeIntros.pptx
+++ b/WelcomeIntros.pptx
@@ -5,24 +5,26 @@
     <p:sldMasterId id="2147483684" r:id="rId1"/>
   </p:sldMasterIdLst>
   <p:notesMasterIdLst>
-    <p:notesMasterId r:id="rId5"/>
+    <p:notesMasterId r:id="rId7"/>
   </p:notesMasterIdLst>
   <p:sldIdLst>
     <p:sldId id="256" r:id="rId2"/>
     <p:sldId id="257" r:id="rId3"/>
-    <p:sldId id="386" r:id="rId4"/>
+    <p:sldId id="387" r:id="rId4"/>
+    <p:sldId id="388" r:id="rId5"/>
+    <p:sldId id="386" r:id="rId6"/>
   </p:sldIdLst>
   <p:sldSz cx="12192000" cy="6858000"/>
   <p:notesSz cx="6858000" cy="9144000"/>
   <p:embeddedFontLst>
     <p:embeddedFont>
       <p:font typeface="Director" pitchFamily="2" charset="0"/>
-      <p:regular r:id="rId6"/>
+      <p:regular r:id="rId8"/>
     </p:embeddedFont>
     <p:embeddedFont>
       <p:font typeface="Inter" panose="02000503000000020004" pitchFamily="2" charset="0"/>
-      <p:regular r:id="rId7"/>
-      <p:bold r:id="rId8"/>
+      <p:regular r:id="rId9"/>
+      <p:bold r:id="rId10"/>
     </p:embeddedFont>
   </p:embeddedFontLst>
   <p:defaultTextStyle>
@@ -210,7 +212,7 @@
           <a:p>
             <a:fld id="{7CF2004C-AD6B-4A9A-A490-3730F26EBC0C}" type="datetimeFigureOut">
               <a:rPr lang="en-US" smtClean="0"/>
-              <a:t>6/4/2025</a:t>
+              <a:t>6/5/2025</a:t>
             </a:fld>
             <a:endParaRPr lang="en-US"/>
           </a:p>
@@ -608,7 +610,7 @@
           <a:p>
             <a:fld id="{2E6CAD52-DA28-4E78-92DA-C35A0DBEE03A}" type="datetimeFigureOut">
               <a:rPr lang="en-US" smtClean="0"/>
-              <a:t>6/4/2025</a:t>
+              <a:t>6/5/2025</a:t>
             </a:fld>
             <a:endParaRPr lang="en-US"/>
           </a:p>
@@ -778,7 +780,7 @@
           <a:p>
             <a:fld id="{2E6CAD52-DA28-4E78-92DA-C35A0DBEE03A}" type="datetimeFigureOut">
               <a:rPr lang="en-US" smtClean="0"/>
-              <a:t>6/4/2025</a:t>
+              <a:t>6/5/2025</a:t>
             </a:fld>
             <a:endParaRPr lang="en-US"/>
           </a:p>
@@ -958,7 +960,7 @@
           <a:p>
             <a:fld id="{2E6CAD52-DA28-4E78-92DA-C35A0DBEE03A}" type="datetimeFigureOut">
               <a:rPr lang="en-US" smtClean="0"/>
-              <a:t>6/4/2025</a:t>
+              <a:t>6/5/2025</a:t>
             </a:fld>
             <a:endParaRPr lang="en-US"/>
           </a:p>
@@ -1128,7 +1130,7 @@
           <a:p>
             <a:fld id="{2E6CAD52-DA28-4E78-92DA-C35A0DBEE03A}" type="datetimeFigureOut">
               <a:rPr lang="en-US" smtClean="0"/>
-              <a:t>6/4/2025</a:t>
+              <a:t>6/5/2025</a:t>
             </a:fld>
             <a:endParaRPr lang="en-US"/>
           </a:p>
@@ -1374,7 +1376,7 @@
           <a:p>
             <a:fld id="{2E6CAD52-DA28-4E78-92DA-C35A0DBEE03A}" type="datetimeFigureOut">
               <a:rPr lang="en-US" smtClean="0"/>
-              <a:t>6/4/2025</a:t>
+              <a:t>6/5/2025</a:t>
             </a:fld>
             <a:endParaRPr lang="en-US"/>
           </a:p>
@@ -1606,7 +1608,7 @@
           <a:p>
             <a:fld id="{2E6CAD52-DA28-4E78-92DA-C35A0DBEE03A}" type="datetimeFigureOut">
               <a:rPr lang="en-US" smtClean="0"/>
-              <a:t>6/4/2025</a:t>
+              <a:t>6/5/2025</a:t>
             </a:fld>
             <a:endParaRPr lang="en-US"/>
           </a:p>
@@ -1973,7 +1975,7 @@
           <a:p>
             <a:fld id="{2E6CAD52-DA28-4E78-92DA-C35A0DBEE03A}" type="datetimeFigureOut">
               <a:rPr lang="en-US" smtClean="0"/>
-              <a:t>6/4/2025</a:t>
+              <a:t>6/5/2025</a:t>
             </a:fld>
             <a:endParaRPr lang="en-US"/>
           </a:p>
@@ -2091,7 +2093,7 @@
           <a:p>
             <a:fld id="{2E6CAD52-DA28-4E78-92DA-C35A0DBEE03A}" type="datetimeFigureOut">
               <a:rPr lang="en-US" smtClean="0"/>
-              <a:t>6/4/2025</a:t>
+              <a:t>6/5/2025</a:t>
             </a:fld>
             <a:endParaRPr lang="en-US"/>
           </a:p>
@@ -2186,7 +2188,7 @@
           <a:p>
             <a:fld id="{2E6CAD52-DA28-4E78-92DA-C35A0DBEE03A}" type="datetimeFigureOut">
               <a:rPr lang="en-US" smtClean="0"/>
-              <a:t>6/4/2025</a:t>
+              <a:t>6/5/2025</a:t>
             </a:fld>
             <a:endParaRPr lang="en-US"/>
           </a:p>
@@ -2463,7 +2465,7 @@
           <a:p>
             <a:fld id="{2E6CAD52-DA28-4E78-92DA-C35A0DBEE03A}" type="datetimeFigureOut">
               <a:rPr lang="en-US" smtClean="0"/>
-              <a:t>6/4/2025</a:t>
+              <a:t>6/5/2025</a:t>
             </a:fld>
             <a:endParaRPr lang="en-US"/>
           </a:p>
@@ -2720,7 +2722,7 @@
           <a:p>
             <a:fld id="{2E6CAD52-DA28-4E78-92DA-C35A0DBEE03A}" type="datetimeFigureOut">
               <a:rPr lang="en-US" smtClean="0"/>
-              <a:t>6/4/2025</a:t>
+              <a:t>6/5/2025</a:t>
             </a:fld>
             <a:endParaRPr lang="en-US"/>
           </a:p>
@@ -2933,7 +2935,7 @@
           <a:p>
             <a:fld id="{2E6CAD52-DA28-4E78-92DA-C35A0DBEE03A}" type="datetimeFigureOut">
               <a:rPr lang="en-US" smtClean="0"/>
-              <a:t>6/4/2025</a:t>
+              <a:t>6/5/2025</a:t>
             </a:fld>
             <a:endParaRPr lang="en-US"/>
           </a:p>
@@ -3501,6 +3503,16 @@
               <a:buFont typeface="Arial" panose="020B0604020202020204" pitchFamily="34" charset="0"/>
               <a:buChar char="•"/>
             </a:pPr>
+            <a:r>
+              <a:rPr lang="en-US" dirty="0"/>
+              <a:t>Photos</a:t>
+            </a:r>
+          </a:p>
+          <a:p>
+            <a:pPr marL="342900" indent="-342900">
+              <a:buFont typeface="Arial" panose="020B0604020202020204" pitchFamily="34" charset="0"/>
+              <a:buChar char="•"/>
+            </a:pPr>
             <a:endParaRPr lang="en-US" dirty="0"/>
           </a:p>
         </p:txBody>
@@ -3555,6 +3567,179 @@
 </file>
 
 <file path=ppt/slides/slide3.xml><?xml version="1.0" encoding="utf-8"?>
+<p:sld xmlns:a="http://schemas.openxmlformats.org/drawingml/2006/main" xmlns:r="http://schemas.openxmlformats.org/officeDocument/2006/relationships" xmlns:p="http://schemas.openxmlformats.org/presentationml/2006/main">
+  <p:cSld>
+    <p:spTree>
+      <p:nvGrpSpPr>
+        <p:cNvPr id="1" name=""/>
+        <p:cNvGrpSpPr/>
+        <p:nvPr/>
+      </p:nvGrpSpPr>
+      <p:grpSpPr>
+        <a:xfrm>
+          <a:off x="0" y="0"/>
+          <a:ext cx="0" cy="0"/>
+          <a:chOff x="0" y="0"/>
+          <a:chExt cx="0" cy="0"/>
+        </a:xfrm>
+      </p:grpSpPr>
+      <p:sp>
+        <p:nvSpPr>
+          <p:cNvPr id="2" name="Title 1">
+            <a:extLst>
+              <a:ext uri="{FF2B5EF4-FFF2-40B4-BE49-F238E27FC236}">
+                <a16:creationId xmlns:a16="http://schemas.microsoft.com/office/drawing/2014/main" id="{3AAF35A1-C251-0BD2-EF2F-AAAE12FD17A4}"/>
+              </a:ext>
+            </a:extLst>
+          </p:cNvPr>
+          <p:cNvSpPr>
+            <a:spLocks noGrp="1"/>
+          </p:cNvSpPr>
+          <p:nvPr>
+            <p:ph type="ctrTitle"/>
+          </p:nvPr>
+        </p:nvSpPr>
+        <p:spPr/>
+        <p:txBody>
+          <a:bodyPr/>
+          <a:lstStyle/>
+          <a:p>
+            <a:r>
+              <a:rPr lang="en-US" dirty="0"/>
+              <a:t>Introductions</a:t>
+            </a:r>
+          </a:p>
+        </p:txBody>
+      </p:sp>
+      <p:sp>
+        <p:nvSpPr>
+          <p:cNvPr id="3" name="Subtitle 2">
+            <a:extLst>
+              <a:ext uri="{FF2B5EF4-FFF2-40B4-BE49-F238E27FC236}">
+                <a16:creationId xmlns:a16="http://schemas.microsoft.com/office/drawing/2014/main" id="{FACB781B-A161-774E-2DCA-A227BA53D269}"/>
+              </a:ext>
+            </a:extLst>
+          </p:cNvPr>
+          <p:cNvSpPr>
+            <a:spLocks noGrp="1"/>
+          </p:cNvSpPr>
+          <p:nvPr>
+            <p:ph type="subTitle" idx="1"/>
+          </p:nvPr>
+        </p:nvSpPr>
+        <p:spPr/>
+        <p:txBody>
+          <a:bodyPr/>
+          <a:lstStyle/>
+          <a:p>
+            <a:endParaRPr lang="en-US"/>
+          </a:p>
+        </p:txBody>
+      </p:sp>
+    </p:spTree>
+    <p:extLst>
+      <p:ext uri="{BB962C8B-B14F-4D97-AF65-F5344CB8AC3E}">
+        <p14:creationId xmlns:p14="http://schemas.microsoft.com/office/powerpoint/2010/main" val="2135413087"/>
+      </p:ext>
+    </p:extLst>
+  </p:cSld>
+  <p:clrMapOvr>
+    <a:masterClrMapping/>
+  </p:clrMapOvr>
+</p:sld>
+</file>
+
+<file path=ppt/slides/slide4.xml><?xml version="1.0" encoding="utf-8"?>
+<p:sld xmlns:a="http://schemas.openxmlformats.org/drawingml/2006/main" xmlns:r="http://schemas.openxmlformats.org/officeDocument/2006/relationships" xmlns:p="http://schemas.openxmlformats.org/presentationml/2006/main">
+  <p:cSld>
+    <p:spTree>
+      <p:nvGrpSpPr>
+        <p:cNvPr id="1" name="">
+          <a:extLst>
+            <a:ext uri="{FF2B5EF4-FFF2-40B4-BE49-F238E27FC236}">
+              <a16:creationId xmlns:a16="http://schemas.microsoft.com/office/drawing/2014/main" id="{E18C41CC-565E-30F9-BD56-475F6C7D558E}"/>
+            </a:ext>
+          </a:extLst>
+        </p:cNvPr>
+        <p:cNvGrpSpPr/>
+        <p:nvPr/>
+      </p:nvGrpSpPr>
+      <p:grpSpPr>
+        <a:xfrm>
+          <a:off x="0" y="0"/>
+          <a:ext cx="0" cy="0"/>
+          <a:chOff x="0" y="0"/>
+          <a:chExt cx="0" cy="0"/>
+        </a:xfrm>
+      </p:grpSpPr>
+      <p:sp>
+        <p:nvSpPr>
+          <p:cNvPr id="2" name="Title 1">
+            <a:extLst>
+              <a:ext uri="{FF2B5EF4-FFF2-40B4-BE49-F238E27FC236}">
+                <a16:creationId xmlns:a16="http://schemas.microsoft.com/office/drawing/2014/main" id="{648D6FBA-3F49-E4D7-5A41-01156F23BAFA}"/>
+              </a:ext>
+            </a:extLst>
+          </p:cNvPr>
+          <p:cNvSpPr>
+            <a:spLocks noGrp="1"/>
+          </p:cNvSpPr>
+          <p:nvPr>
+            <p:ph type="ctrTitle"/>
+          </p:nvPr>
+        </p:nvSpPr>
+        <p:spPr/>
+        <p:txBody>
+          <a:bodyPr/>
+          <a:lstStyle/>
+          <a:p>
+            <a:r>
+              <a:rPr lang="en-US"/>
+              <a:t>Photos</a:t>
+            </a:r>
+            <a:endParaRPr lang="en-US" dirty="0"/>
+          </a:p>
+        </p:txBody>
+      </p:sp>
+      <p:sp>
+        <p:nvSpPr>
+          <p:cNvPr id="3" name="Subtitle 2">
+            <a:extLst>
+              <a:ext uri="{FF2B5EF4-FFF2-40B4-BE49-F238E27FC236}">
+                <a16:creationId xmlns:a16="http://schemas.microsoft.com/office/drawing/2014/main" id="{97664F70-3C89-C4E9-4257-4AD587C3727A}"/>
+              </a:ext>
+            </a:extLst>
+          </p:cNvPr>
+          <p:cNvSpPr>
+            <a:spLocks noGrp="1"/>
+          </p:cNvSpPr>
+          <p:nvPr>
+            <p:ph type="subTitle" idx="1"/>
+          </p:nvPr>
+        </p:nvSpPr>
+        <p:spPr/>
+        <p:txBody>
+          <a:bodyPr/>
+          <a:lstStyle/>
+          <a:p>
+            <a:endParaRPr lang="en-US"/>
+          </a:p>
+        </p:txBody>
+      </p:sp>
+    </p:spTree>
+    <p:extLst>
+      <p:ext uri="{BB962C8B-B14F-4D97-AF65-F5344CB8AC3E}">
+        <p14:creationId xmlns:p14="http://schemas.microsoft.com/office/powerpoint/2010/main" val="2665885096"/>
+      </p:ext>
+    </p:extLst>
+  </p:cSld>
+  <p:clrMapOvr>
+    <a:masterClrMapping/>
+  </p:clrMapOvr>
+</p:sld>
+</file>
+
+<file path=ppt/slides/slide5.xml><?xml version="1.0" encoding="utf-8"?>
 <p:sld xmlns:a="http://schemas.openxmlformats.org/drawingml/2006/main" xmlns:r="http://schemas.openxmlformats.org/officeDocument/2006/relationships" xmlns:p="http://schemas.openxmlformats.org/presentationml/2006/main">
   <p:cSld>
     <p:spTree>

</xml_diff>